<commit_message>
fix bus and motor slide
</commit_message>
<xml_diff>
--- a/Document/presentation/search_bus.pptx
+++ b/Document/presentation/search_bus.pptx
@@ -119,7 +119,18 @@
   </p:defaultTextStyle>
   <p:extLst>
     <p:ext uri="{EFAFB233-063F-42B5-8137-9DF3F51BA10A}">
-      <p15:sldGuideLst xmlns:p15="http://schemas.microsoft.com/office/powerpoint/2012/main" xmlns=""/>
+      <p15:sldGuideLst xmlns:p15="http://schemas.microsoft.com/office/powerpoint/2012/main">
+        <p15:guide id="1" orient="horz" pos="2160">
+          <p15:clr>
+            <a:srgbClr val="A4A3A4"/>
+          </p15:clr>
+        </p15:guide>
+        <p15:guide id="2" pos="2880">
+          <p15:clr>
+            <a:srgbClr val="A4A3A4"/>
+          </p15:clr>
+        </p15:guide>
+      </p15:sldGuideLst>
     </p:ext>
   </p:extLst>
 </p:presentation>
@@ -207,7 +218,7 @@
           <a:p>
             <a:fld id="{DB638E9B-52C4-DC4B-9E8A-4837C38FE505}" type="datetimeFigureOut">
               <a:rPr lang="en-US" smtClean="0"/>
-              <a:t>12/11/2015</a:t>
+              <a:t>12/11/15</a:t>
             </a:fld>
             <a:endParaRPr lang="en-US"/>
           </a:p>
@@ -789,15 +800,11 @@
             </a:r>
             <a:r>
               <a:rPr lang="en-US" baseline="0" dirty="0" err="1" smtClean="0"/>
-              <a:t>máy</a:t>
-            </a:r>
-            <a:r>
-              <a:rPr lang="en-US" baseline="0" dirty="0" smtClean="0"/>
-              <a:t> </a:t>
-            </a:r>
-            <a:r>
-              <a:rPr lang="en-US" baseline="0" dirty="0" err="1" smtClean="0"/>
-              <a:t>tối</a:t>
+              <a:t>buyt</a:t>
+            </a:r>
+            <a:r>
+              <a:rPr lang="en-US" baseline="0" smtClean="0"/>
+              <a:t> tối</a:t>
             </a:r>
             <a:r>
               <a:rPr lang="en-US" baseline="0" dirty="0" smtClean="0"/>
@@ -3093,230 +3100,6 @@
           <a:bodyPr/>
           <a:lstStyle/>
           <a:p>
-            <a:r>
-              <a:rPr lang="en-US" dirty="0" err="1" smtClean="0"/>
-              <a:t>Để</a:t>
-            </a:r>
-            <a:r>
-              <a:rPr lang="en-US" baseline="0" dirty="0" smtClean="0"/>
-              <a:t> </a:t>
-            </a:r>
-            <a:r>
-              <a:rPr lang="en-US" baseline="0" dirty="0" err="1" smtClean="0"/>
-              <a:t>hiển</a:t>
-            </a:r>
-            <a:r>
-              <a:rPr lang="en-US" baseline="0" dirty="0" smtClean="0"/>
-              <a:t> </a:t>
-            </a:r>
-            <a:r>
-              <a:rPr lang="en-US" baseline="0" dirty="0" err="1" smtClean="0"/>
-              <a:t>thị</a:t>
-            </a:r>
-            <a:r>
-              <a:rPr lang="en-US" baseline="0" dirty="0" smtClean="0"/>
-              <a:t> </a:t>
-            </a:r>
-            <a:r>
-              <a:rPr lang="en-US" baseline="0" dirty="0" err="1" smtClean="0"/>
-              <a:t>đường</a:t>
-            </a:r>
-            <a:r>
-              <a:rPr lang="en-US" baseline="0" dirty="0" smtClean="0"/>
-              <a:t> </a:t>
-            </a:r>
-            <a:r>
-              <a:rPr lang="en-US" baseline="0" dirty="0" err="1" smtClean="0"/>
-              <a:t>đi</a:t>
-            </a:r>
-            <a:r>
-              <a:rPr lang="en-US" baseline="0" dirty="0" smtClean="0"/>
-              <a:t> </a:t>
-            </a:r>
-            <a:r>
-              <a:rPr lang="en-US" baseline="0" dirty="0" err="1" smtClean="0"/>
-              <a:t>tốt</a:t>
-            </a:r>
-            <a:r>
-              <a:rPr lang="en-US" baseline="0" dirty="0" smtClean="0"/>
-              <a:t> </a:t>
-            </a:r>
-            <a:r>
-              <a:rPr lang="en-US" baseline="0" dirty="0" err="1" smtClean="0"/>
-              <a:t>nhất</a:t>
-            </a:r>
-            <a:r>
-              <a:rPr lang="en-US" baseline="0" dirty="0" smtClean="0"/>
-              <a:t> </a:t>
-            </a:r>
-            <a:r>
-              <a:rPr lang="en-US" baseline="0" dirty="0" err="1" smtClean="0"/>
-              <a:t>này</a:t>
-            </a:r>
-            <a:r>
-              <a:rPr lang="en-US" baseline="0" dirty="0" smtClean="0"/>
-              <a:t>..</a:t>
-            </a:r>
-            <a:r>
-              <a:rPr lang="en-US" baseline="0" dirty="0" err="1" smtClean="0"/>
-              <a:t>chúng</a:t>
-            </a:r>
-            <a:r>
-              <a:rPr lang="en-US" baseline="0" dirty="0" smtClean="0"/>
-              <a:t> </a:t>
-            </a:r>
-            <a:r>
-              <a:rPr lang="en-US" baseline="0" dirty="0" err="1" smtClean="0"/>
-              <a:t>tôi</a:t>
-            </a:r>
-            <a:r>
-              <a:rPr lang="en-US" baseline="0" dirty="0" smtClean="0"/>
-              <a:t> </a:t>
-            </a:r>
-            <a:r>
-              <a:rPr lang="en-US" baseline="0" dirty="0" err="1" smtClean="0"/>
-              <a:t>tạo</a:t>
-            </a:r>
-            <a:r>
-              <a:rPr lang="en-US" baseline="0" dirty="0" smtClean="0"/>
-              <a:t> </a:t>
-            </a:r>
-            <a:r>
-              <a:rPr lang="en-US" baseline="0" dirty="0" err="1" smtClean="0"/>
-              <a:t>ra</a:t>
-            </a:r>
-            <a:r>
-              <a:rPr lang="en-US" baseline="0" dirty="0" smtClean="0"/>
-              <a:t> </a:t>
-            </a:r>
-            <a:r>
-              <a:rPr lang="en-US" baseline="0" dirty="0" err="1" smtClean="0"/>
-              <a:t>một</a:t>
-            </a:r>
-            <a:r>
-              <a:rPr lang="en-US" baseline="0" dirty="0" smtClean="0"/>
-              <a:t> class step </a:t>
-            </a:r>
-            <a:r>
-              <a:rPr lang="en-US" baseline="0" dirty="0" err="1" smtClean="0"/>
-              <a:t>để</a:t>
-            </a:r>
-            <a:r>
-              <a:rPr lang="en-US" baseline="0" dirty="0" smtClean="0"/>
-              <a:t> </a:t>
-            </a:r>
-            <a:r>
-              <a:rPr lang="en-US" baseline="0" dirty="0" err="1" smtClean="0"/>
-              <a:t>chứa</a:t>
-            </a:r>
-            <a:r>
-              <a:rPr lang="en-US" baseline="0" dirty="0" smtClean="0"/>
-              <a:t> </a:t>
-            </a:r>
-            <a:r>
-              <a:rPr lang="en-US" baseline="0" dirty="0" err="1" smtClean="0"/>
-              <a:t>các</a:t>
-            </a:r>
-            <a:r>
-              <a:rPr lang="en-US" baseline="0" dirty="0" smtClean="0"/>
-              <a:t> </a:t>
-            </a:r>
-            <a:r>
-              <a:rPr lang="en-US" baseline="0" dirty="0" err="1" smtClean="0"/>
-              <a:t>hướng</a:t>
-            </a:r>
-            <a:r>
-              <a:rPr lang="en-US" baseline="0" dirty="0" smtClean="0"/>
-              <a:t> </a:t>
-            </a:r>
-            <a:r>
-              <a:rPr lang="en-US" baseline="0" dirty="0" err="1" smtClean="0"/>
-              <a:t>dẫn</a:t>
-            </a:r>
-            <a:r>
-              <a:rPr lang="en-US" baseline="0" dirty="0" smtClean="0"/>
-              <a:t>.. </a:t>
-            </a:r>
-            <a:r>
-              <a:rPr lang="en-US" baseline="0" dirty="0" err="1" smtClean="0"/>
-              <a:t>Và</a:t>
-            </a:r>
-            <a:r>
-              <a:rPr lang="en-US" baseline="0" dirty="0" smtClean="0"/>
-              <a:t> </a:t>
-            </a:r>
-            <a:r>
-              <a:rPr lang="en-US" baseline="0" dirty="0" err="1" smtClean="0"/>
-              <a:t>một</a:t>
-            </a:r>
-            <a:r>
-              <a:rPr lang="en-US" baseline="0" dirty="0" smtClean="0"/>
-              <a:t> leg. </a:t>
-            </a:r>
-            <a:r>
-              <a:rPr lang="en-US" baseline="0" dirty="0" err="1" smtClean="0"/>
-              <a:t>Để</a:t>
-            </a:r>
-            <a:r>
-              <a:rPr lang="en-US" baseline="0" dirty="0" smtClean="0"/>
-              <a:t> </a:t>
-            </a:r>
-            <a:r>
-              <a:rPr lang="en-US" baseline="0" dirty="0" err="1" smtClean="0"/>
-              <a:t>chứa</a:t>
-            </a:r>
-            <a:r>
-              <a:rPr lang="en-US" baseline="0" dirty="0" smtClean="0"/>
-              <a:t> </a:t>
-            </a:r>
-            <a:r>
-              <a:rPr lang="en-US" baseline="0" dirty="0" err="1" smtClean="0"/>
-              <a:t>kết</a:t>
-            </a:r>
-            <a:r>
-              <a:rPr lang="en-US" baseline="0" dirty="0" smtClean="0"/>
-              <a:t> </a:t>
-            </a:r>
-            <a:r>
-              <a:rPr lang="en-US" baseline="0" dirty="0" err="1" smtClean="0"/>
-              <a:t>quả</a:t>
-            </a:r>
-            <a:r>
-              <a:rPr lang="en-US" baseline="0" dirty="0" smtClean="0"/>
-              <a:t> </a:t>
-            </a:r>
-            <a:r>
-              <a:rPr lang="en-US" baseline="0" dirty="0" err="1" smtClean="0"/>
-              <a:t>đường</a:t>
-            </a:r>
-            <a:r>
-              <a:rPr lang="en-US" baseline="0" dirty="0" smtClean="0"/>
-              <a:t> </a:t>
-            </a:r>
-            <a:r>
-              <a:rPr lang="en-US" baseline="0" dirty="0" err="1" smtClean="0"/>
-              <a:t>đi</a:t>
-            </a:r>
-            <a:r>
-              <a:rPr lang="en-US" baseline="0" dirty="0" smtClean="0"/>
-              <a:t> </a:t>
-            </a:r>
-            <a:r>
-              <a:rPr lang="en-US" baseline="0" dirty="0" err="1" smtClean="0"/>
-              <a:t>của</a:t>
-            </a:r>
-            <a:r>
-              <a:rPr lang="en-US" baseline="0" dirty="0" smtClean="0"/>
-              <a:t> 2 </a:t>
-            </a:r>
-            <a:r>
-              <a:rPr lang="en-US" baseline="0" dirty="0" err="1" smtClean="0"/>
-              <a:t>điểm</a:t>
-            </a:r>
-            <a:r>
-              <a:rPr lang="en-US" baseline="0" dirty="0" smtClean="0"/>
-              <a:t>.</a:t>
-            </a:r>
             <a:endParaRPr lang="en-US" dirty="0"/>
           </a:p>
         </p:txBody>
@@ -5597,7 +5380,19 @@
               <a:rPr lang="en-US" dirty="0" smtClean="0">
                 <a:latin typeface="Cambria" pitchFamily="18" charset="0"/>
               </a:rPr>
-              <a:t>Demo four points optimize</a:t>
+              <a:t>Demo </a:t>
+            </a:r>
+            <a:r>
+              <a:rPr lang="en-US" dirty="0" smtClean="0">
+                <a:latin typeface="Cambria" pitchFamily="18" charset="0"/>
+              </a:rPr>
+              <a:t>bus four </a:t>
+            </a:r>
+            <a:r>
+              <a:rPr lang="en-US" dirty="0" smtClean="0">
+                <a:latin typeface="Cambria" pitchFamily="18" charset="0"/>
+              </a:rPr>
+              <a:t>points optimize</a:t>
             </a:r>
             <a:endParaRPr lang="en-US" dirty="0">
               <a:latin typeface="Cambria" pitchFamily="18" charset="0"/>
@@ -5638,7 +5433,7 @@
         <p:spPr>
           <a:xfrm>
             <a:off x="457200" y="2527462"/>
-            <a:ext cx="7083188" cy="1538883"/>
+            <a:ext cx="8503920" cy="1969770"/>
           </a:xfrm>
           <a:prstGeom prst="rect">
             <a:avLst/>
@@ -5665,11 +5460,11 @@
               </a:defRPr>
             </a:pPr>
             <a:r>
-              <a:rPr lang="en-US" sz="2100" dirty="0"/>
+              <a:rPr lang="en-US" sz="2800" dirty="0"/>
               <a:t>Start location:</a:t>
             </a:r>
             <a:r>
-              <a:rPr lang="en-US" sz="2100" dirty="0">
+              <a:rPr lang="en-US" sz="2800" dirty="0">
                 <a:solidFill>
                   <a:srgbClr val="000000"/>
                 </a:solidFill>
@@ -5677,7 +5472,7 @@
               <a:t>  </a:t>
             </a:r>
             <a:r>
-              <a:rPr lang="en-US" sz="2100" dirty="0" err="1">
+              <a:rPr lang="en-US" sz="2800" dirty="0" err="1">
                 <a:solidFill>
                   <a:srgbClr val="000000"/>
                 </a:solidFill>
@@ -5685,7 +5480,7 @@
               <a:t>Bến</a:t>
             </a:r>
             <a:r>
-              <a:rPr lang="en-US" sz="2100" dirty="0">
+              <a:rPr lang="en-US" sz="2800" dirty="0">
                 <a:solidFill>
                   <a:srgbClr val="000000"/>
                 </a:solidFill>
@@ -5693,7 +5488,7 @@
               <a:t> </a:t>
             </a:r>
             <a:r>
-              <a:rPr lang="en-US" sz="2100" dirty="0" err="1">
+              <a:rPr lang="en-US" sz="2800" dirty="0" err="1">
                 <a:solidFill>
                   <a:srgbClr val="000000"/>
                 </a:solidFill>
@@ -5701,7 +5496,7 @@
               <a:t>xe</a:t>
             </a:r>
             <a:r>
-              <a:rPr lang="en-US" sz="2100" dirty="0">
+              <a:rPr lang="en-US" sz="2800" dirty="0">
                 <a:solidFill>
                   <a:srgbClr val="000000"/>
                 </a:solidFill>
@@ -5709,7 +5504,7 @@
               <a:t> </a:t>
             </a:r>
             <a:r>
-              <a:rPr lang="en-US" sz="2100" dirty="0" err="1">
+              <a:rPr lang="en-US" sz="2800" dirty="0" err="1">
                 <a:solidFill>
                   <a:srgbClr val="000000"/>
                 </a:solidFill>
@@ -5717,14 +5512,14 @@
               <a:t>quận</a:t>
             </a:r>
             <a:r>
-              <a:rPr lang="en-US" sz="2100" dirty="0">
+              <a:rPr lang="en-US" sz="2800" dirty="0">
                 <a:solidFill>
                   <a:srgbClr val="000000"/>
                 </a:solidFill>
               </a:rPr>
               <a:t> 8</a:t>
             </a:r>
-            <a:endParaRPr lang="en-US" sz="2100" dirty="0"/>
+            <a:endParaRPr lang="en-US" sz="2800" dirty="0"/>
           </a:p>
           <a:p>
             <a:pPr marL="514350" lvl="1" indent="-171450">
@@ -5742,11 +5537,11 @@
               </a:defRPr>
             </a:pPr>
             <a:r>
-              <a:rPr lang="en-US" sz="2100" dirty="0"/>
+              <a:rPr lang="en-US" sz="2800" dirty="0"/>
               <a:t>First middle location: </a:t>
             </a:r>
             <a:r>
-              <a:rPr lang="en-US" sz="2100" dirty="0">
+              <a:rPr lang="en-US" sz="2800" dirty="0">
                 <a:solidFill>
                   <a:srgbClr val="000000"/>
                 </a:solidFill>
@@ -5754,7 +5549,7 @@
               <a:t>280 </a:t>
             </a:r>
             <a:r>
-              <a:rPr lang="en-US" sz="2100" dirty="0" err="1">
+              <a:rPr lang="en-US" sz="2800" dirty="0" err="1">
                 <a:solidFill>
                   <a:srgbClr val="000000"/>
                 </a:solidFill>
@@ -5762,7 +5557,7 @@
               <a:t>Nguyễn</a:t>
             </a:r>
             <a:r>
-              <a:rPr lang="en-US" sz="2100" dirty="0">
+              <a:rPr lang="en-US" sz="2800" dirty="0">
                 <a:solidFill>
                   <a:srgbClr val="000000"/>
                 </a:solidFill>
@@ -5770,7 +5565,7 @@
               <a:t> </a:t>
             </a:r>
             <a:r>
-              <a:rPr lang="en-US" sz="2100" dirty="0" err="1">
+              <a:rPr lang="en-US" sz="2800" dirty="0" err="1">
                 <a:solidFill>
                   <a:srgbClr val="000000"/>
                 </a:solidFill>
@@ -5778,7 +5573,7 @@
               <a:t>Đình</a:t>
             </a:r>
             <a:r>
-              <a:rPr lang="en-US" sz="2100" dirty="0">
+              <a:rPr lang="en-US" sz="2800" dirty="0">
                 <a:solidFill>
                   <a:srgbClr val="000000"/>
                 </a:solidFill>
@@ -5786,14 +5581,14 @@
               <a:t> </a:t>
             </a:r>
             <a:r>
-              <a:rPr lang="en-US" sz="2100" dirty="0" err="1">
+              <a:rPr lang="en-US" sz="2800" dirty="0" err="1">
                 <a:solidFill>
                   <a:srgbClr val="000000"/>
                 </a:solidFill>
               </a:rPr>
               <a:t>Chiểu</a:t>
             </a:r>
-            <a:endParaRPr lang="en-US" sz="2100" dirty="0">
+            <a:endParaRPr lang="en-US" sz="2800" dirty="0">
               <a:solidFill>
                 <a:srgbClr val="000000"/>
               </a:solidFill>
@@ -5815,11 +5610,11 @@
               </a:defRPr>
             </a:pPr>
             <a:r>
-              <a:rPr lang="en-US" sz="2100" dirty="0"/>
+              <a:rPr lang="en-US" sz="2800" dirty="0"/>
               <a:t>Second middle location: </a:t>
             </a:r>
             <a:r>
-              <a:rPr lang="en-US" sz="2100" dirty="0" err="1">
+              <a:rPr lang="en-US" sz="2800" dirty="0" err="1">
                 <a:solidFill>
                   <a:srgbClr val="000000"/>
                 </a:solidFill>
@@ -5827,7 +5622,7 @@
               <a:t>VinCom</a:t>
             </a:r>
             <a:r>
-              <a:rPr lang="en-US" sz="2100" dirty="0">
+              <a:rPr lang="en-US" sz="2800" dirty="0">
                 <a:solidFill>
                   <a:srgbClr val="000000"/>
                 </a:solidFill>
@@ -5835,7 +5630,7 @@
               <a:t> </a:t>
             </a:r>
             <a:r>
-              <a:rPr lang="en-US" sz="2100" dirty="0" err="1">
+              <a:rPr lang="en-US" sz="2800" dirty="0" err="1">
                 <a:solidFill>
                   <a:srgbClr val="000000"/>
                 </a:solidFill>
@@ -5843,7 +5638,7 @@
               <a:t>Lê</a:t>
             </a:r>
             <a:r>
-              <a:rPr lang="en-US" sz="2100" dirty="0">
+              <a:rPr lang="en-US" sz="2800" dirty="0">
                 <a:solidFill>
                   <a:srgbClr val="000000"/>
                 </a:solidFill>
@@ -5851,7 +5646,7 @@
               <a:t> </a:t>
             </a:r>
             <a:r>
-              <a:rPr lang="en-US" sz="2100" dirty="0" err="1">
+              <a:rPr lang="en-US" sz="2800" dirty="0" err="1">
                 <a:solidFill>
                   <a:srgbClr val="000000"/>
                 </a:solidFill>
@@ -5859,7 +5654,7 @@
               <a:t>Thánh</a:t>
             </a:r>
             <a:r>
-              <a:rPr lang="en-US" sz="2100" dirty="0">
+              <a:rPr lang="en-US" sz="2800" dirty="0">
                 <a:solidFill>
                   <a:srgbClr val="000000"/>
                 </a:solidFill>
@@ -5867,7 +5662,7 @@
               <a:t> </a:t>
             </a:r>
             <a:r>
-              <a:rPr lang="en-US" sz="2100" dirty="0" err="1">
+              <a:rPr lang="en-US" sz="2800" dirty="0" err="1">
                 <a:solidFill>
                   <a:srgbClr val="000000"/>
                 </a:solidFill>
@@ -5875,7 +5670,7 @@
               <a:t>Tôn</a:t>
             </a:r>
             <a:r>
-              <a:rPr lang="en-US" sz="2100" dirty="0"/>
+              <a:rPr lang="en-US" sz="2800" dirty="0"/>
               <a:t> </a:t>
             </a:r>
           </a:p>
@@ -5895,11 +5690,11 @@
               </a:defRPr>
             </a:pPr>
             <a:r>
-              <a:rPr lang="en-US" sz="2100" dirty="0"/>
+              <a:rPr lang="en-US" sz="2800" dirty="0"/>
               <a:t>End location: </a:t>
             </a:r>
             <a:r>
-              <a:rPr lang="en-US" sz="2100" dirty="0" err="1">
+              <a:rPr lang="en-US" sz="2800" dirty="0" err="1">
                 <a:solidFill>
                   <a:srgbClr val="000000"/>
                 </a:solidFill>
@@ -5907,7 +5702,7 @@
               <a:t>Công</a:t>
             </a:r>
             <a:r>
-              <a:rPr lang="en-US" sz="2100" dirty="0">
+              <a:rPr lang="en-US" sz="2800" dirty="0">
                 <a:solidFill>
                   <a:srgbClr val="000000"/>
                 </a:solidFill>
@@ -5915,7 +5710,7 @@
               <a:t> </a:t>
             </a:r>
             <a:r>
-              <a:rPr lang="en-US" sz="2100" dirty="0" err="1">
+              <a:rPr lang="en-US" sz="2800" dirty="0" err="1">
                 <a:solidFill>
                   <a:srgbClr val="000000"/>
                 </a:solidFill>
@@ -5923,7 +5718,7 @@
               <a:t>Viên</a:t>
             </a:r>
             <a:r>
-              <a:rPr lang="en-US" sz="2100" dirty="0">
+              <a:rPr lang="en-US" sz="2800" dirty="0">
                 <a:solidFill>
                   <a:srgbClr val="000000"/>
                 </a:solidFill>
@@ -5931,7 +5726,7 @@
               <a:t> Tao </a:t>
             </a:r>
             <a:r>
-              <a:rPr lang="en-US" sz="2100" dirty="0" err="1">
+              <a:rPr lang="en-US" sz="2800" dirty="0" err="1">
                 <a:solidFill>
                   <a:srgbClr val="000000"/>
                 </a:solidFill>
@@ -5939,14 +5734,14 @@
               <a:t>Đàn</a:t>
             </a:r>
             <a:r>
-              <a:rPr lang="en-US" sz="2100" dirty="0">
+              <a:rPr lang="en-US" sz="2800" dirty="0">
                 <a:solidFill>
                   <a:srgbClr val="000000"/>
                 </a:solidFill>
               </a:rPr>
               <a:t> </a:t>
             </a:r>
-            <a:endParaRPr lang="en-US" dirty="0"/>
+            <a:endParaRPr lang="en-US" sz="2800" dirty="0"/>
           </a:p>
         </p:txBody>
       </p:sp>
@@ -10393,7 +10188,7 @@
   <a:extraClrSchemeLst/>
   <a:extLst>
     <a:ext uri="{05A4C25C-085E-4340-85A3-A5531E510DB2}">
-      <thm15:themeFamily xmlns:thm15="http://schemas.microsoft.com/office/thememl/2012/main" xmlns="" name="Office Theme" id="{62F939B6-93AF-4DB8-9C6B-D6C7DFDC589F}" vid="{4A3C46E8-61CC-4603-A589-7422A47A8E4A}"/>
+      <thm15:themeFamily xmlns:thm15="http://schemas.microsoft.com/office/thememl/2012/main" name="Office Theme" id="{62F939B6-93AF-4DB8-9C6B-D6C7DFDC589F}" vid="{4A3C46E8-61CC-4603-A589-7422A47A8E4A}"/>
     </a:ext>
   </a:extLst>
 </a:theme>

</xml_diff>